<commit_message>
feat: complete milestone presentation
</commit_message>
<xml_diff>
--- a/Milestone.pptx
+++ b/Milestone.pptx
@@ -5,7 +5,7 @@
     <p:sldMasterId id="2147483648" r:id="rId1"/>
   </p:sldMasterIdLst>
   <p:notesMasterIdLst>
-    <p:notesMasterId r:id="rId15"/>
+    <p:notesMasterId r:id="rId21"/>
   </p:notesMasterIdLst>
   <p:sldIdLst>
     <p:sldId id="256" r:id="rId2"/>
@@ -15,12 +15,18 @@
     <p:sldId id="265" r:id="rId6"/>
     <p:sldId id="264" r:id="rId7"/>
     <p:sldId id="271" r:id="rId8"/>
-    <p:sldId id="257" r:id="rId9"/>
-    <p:sldId id="258" r:id="rId10"/>
-    <p:sldId id="259" r:id="rId11"/>
-    <p:sldId id="260" r:id="rId12"/>
-    <p:sldId id="261" r:id="rId13"/>
-    <p:sldId id="267" r:id="rId14"/>
+    <p:sldId id="272" r:id="rId9"/>
+    <p:sldId id="273" r:id="rId10"/>
+    <p:sldId id="274" r:id="rId11"/>
+    <p:sldId id="275" r:id="rId12"/>
+    <p:sldId id="277" r:id="rId13"/>
+    <p:sldId id="278" r:id="rId14"/>
+    <p:sldId id="279" r:id="rId15"/>
+    <p:sldId id="280" r:id="rId16"/>
+    <p:sldId id="276" r:id="rId17"/>
+    <p:sldId id="257" r:id="rId18"/>
+    <p:sldId id="281" r:id="rId19"/>
+    <p:sldId id="267" r:id="rId20"/>
   </p:sldIdLst>
   <p:sldSz cx="12192000" cy="6858000"/>
   <p:notesSz cx="6858000" cy="9144000"/>
@@ -119,6 +125,11 @@
       </a:defRPr>
     </a:lvl9pPr>
   </p:defaultTextStyle>
+  <p:extLst>
+    <p:ext uri="{EFAFB233-063F-42B5-8137-9DF3F51BA10A}">
+      <p15:sldGuideLst xmlns:p15="http://schemas.microsoft.com/office/powerpoint/2012/main"/>
+    </p:ext>
+  </p:extLst>
 </p:presentation>
 </file>
 
@@ -5882,7 +5893,7 @@
       <dgm:spPr/>
     </dgm:pt>
     <dgm:pt modelId="{C402B34C-BFB8-3447-A1AD-29A5120D3CD2}" type="pres">
-      <dgm:prSet presAssocID="{87878CB1-C53D-CD4D-AC5A-41803002E304}" presName="parentTextArrow" presStyleLbl="node1" presStyleIdx="3" presStyleCnt="6"/>
+      <dgm:prSet presAssocID="{87878CB1-C53D-CD4D-AC5A-41803002E304}" presName="parentTextArrow" presStyleLbl="node1" presStyleIdx="3" presStyleCnt="6" custLinFactNeighborX="-2336" custLinFactNeighborY="1614"/>
       <dgm:spPr/>
     </dgm:pt>
     <dgm:pt modelId="{00DC325E-8538-D745-AF94-3733E0EF09AD}" type="pres">
@@ -10933,7 +10944,7 @@
       </dsp:nvSpPr>
       <dsp:spPr>
         <a:xfrm rot="10800000">
-          <a:off x="0" y="1539102"/>
+          <a:off x="0" y="1551628"/>
           <a:ext cx="7508358" cy="776091"/>
         </a:xfrm>
         <a:prstGeom prst="upArrowCallout">
@@ -11006,7 +11017,7 @@
         </a:p>
       </dsp:txBody>
       <dsp:txXfrm rot="10800000">
-        <a:off x="0" y="1539102"/>
+        <a:off x="0" y="1551628"/>
         <a:ext cx="7508358" cy="504281"/>
       </dsp:txXfrm>
     </dsp:sp>
@@ -21003,7 +21014,7 @@
           <a:p>
             <a:fld id="{BA13674A-C681-5A40-A135-E8E4A4E297FA}" type="datetimeFigureOut">
               <a:rPr lang="pl-PL" smtClean="0"/>
-              <a:t>12.01.2025</a:t>
+              <a:t>13.01.2025</a:t>
             </a:fld>
             <a:endParaRPr lang="pl-PL"/>
           </a:p>
@@ -21501,7 +21512,7 @@
           <a:p>
             <a:fld id="{9B89C315-6106-1B42-B767-BBB365CBF4AA}" type="datetimeFigureOut">
               <a:rPr lang="pl-PL" smtClean="0"/>
-              <a:t>12.01.2025</a:t>
+              <a:t>13.01.2025</a:t>
             </a:fld>
             <a:endParaRPr lang="pl-PL"/>
           </a:p>
@@ -21699,7 +21710,7 @@
           <a:p>
             <a:fld id="{9B89C315-6106-1B42-B767-BBB365CBF4AA}" type="datetimeFigureOut">
               <a:rPr lang="pl-PL" smtClean="0"/>
-              <a:t>12.01.2025</a:t>
+              <a:t>13.01.2025</a:t>
             </a:fld>
             <a:endParaRPr lang="pl-PL"/>
           </a:p>
@@ -21907,7 +21918,7 @@
           <a:p>
             <a:fld id="{9B89C315-6106-1B42-B767-BBB365CBF4AA}" type="datetimeFigureOut">
               <a:rPr lang="pl-PL" smtClean="0"/>
-              <a:t>12.01.2025</a:t>
+              <a:t>13.01.2025</a:t>
             </a:fld>
             <a:endParaRPr lang="pl-PL"/>
           </a:p>
@@ -22105,7 +22116,7 @@
           <a:p>
             <a:fld id="{9B89C315-6106-1B42-B767-BBB365CBF4AA}" type="datetimeFigureOut">
               <a:rPr lang="pl-PL" smtClean="0"/>
-              <a:t>12.01.2025</a:t>
+              <a:t>13.01.2025</a:t>
             </a:fld>
             <a:endParaRPr lang="pl-PL"/>
           </a:p>
@@ -22380,7 +22391,7 @@
           <a:p>
             <a:fld id="{9B89C315-6106-1B42-B767-BBB365CBF4AA}" type="datetimeFigureOut">
               <a:rPr lang="pl-PL" smtClean="0"/>
-              <a:t>12.01.2025</a:t>
+              <a:t>13.01.2025</a:t>
             </a:fld>
             <a:endParaRPr lang="pl-PL"/>
           </a:p>
@@ -22645,7 +22656,7 @@
           <a:p>
             <a:fld id="{9B89C315-6106-1B42-B767-BBB365CBF4AA}" type="datetimeFigureOut">
               <a:rPr lang="pl-PL" smtClean="0"/>
-              <a:t>12.01.2025</a:t>
+              <a:t>13.01.2025</a:t>
             </a:fld>
             <a:endParaRPr lang="pl-PL"/>
           </a:p>
@@ -23057,7 +23068,7 @@
           <a:p>
             <a:fld id="{9B89C315-6106-1B42-B767-BBB365CBF4AA}" type="datetimeFigureOut">
               <a:rPr lang="pl-PL" smtClean="0"/>
-              <a:t>12.01.2025</a:t>
+              <a:t>13.01.2025</a:t>
             </a:fld>
             <a:endParaRPr lang="pl-PL"/>
           </a:p>
@@ -23198,7 +23209,7 @@
           <a:p>
             <a:fld id="{9B89C315-6106-1B42-B767-BBB365CBF4AA}" type="datetimeFigureOut">
               <a:rPr lang="pl-PL" smtClean="0"/>
-              <a:t>12.01.2025</a:t>
+              <a:t>13.01.2025</a:t>
             </a:fld>
             <a:endParaRPr lang="pl-PL"/>
           </a:p>
@@ -23311,7 +23322,7 @@
           <a:p>
             <a:fld id="{9B89C315-6106-1B42-B767-BBB365CBF4AA}" type="datetimeFigureOut">
               <a:rPr lang="pl-PL" smtClean="0"/>
-              <a:t>12.01.2025</a:t>
+              <a:t>13.01.2025</a:t>
             </a:fld>
             <a:endParaRPr lang="pl-PL"/>
           </a:p>
@@ -23622,7 +23633,7 @@
           <a:p>
             <a:fld id="{9B89C315-6106-1B42-B767-BBB365CBF4AA}" type="datetimeFigureOut">
               <a:rPr lang="pl-PL" smtClean="0"/>
-              <a:t>12.01.2025</a:t>
+              <a:t>13.01.2025</a:t>
             </a:fld>
             <a:endParaRPr lang="pl-PL"/>
           </a:p>
@@ -23910,7 +23921,7 @@
           <a:p>
             <a:fld id="{9B89C315-6106-1B42-B767-BBB365CBF4AA}" type="datetimeFigureOut">
               <a:rPr lang="pl-PL" smtClean="0"/>
-              <a:t>12.01.2025</a:t>
+              <a:t>13.01.2025</a:t>
             </a:fld>
             <a:endParaRPr lang="pl-PL"/>
           </a:p>
@@ -24151,7 +24162,7 @@
           <a:p>
             <a:fld id="{9B89C315-6106-1B42-B767-BBB365CBF4AA}" type="datetimeFigureOut">
               <a:rPr lang="pl-PL" smtClean="0"/>
-              <a:t>12.01.2025</a:t>
+              <a:t>13.01.2025</a:t>
             </a:fld>
             <a:endParaRPr lang="pl-PL"/>
           </a:p>
@@ -24680,7 +24691,13 @@
   <p:cSld>
     <p:spTree>
       <p:nvGrpSpPr>
-        <p:cNvPr id="1" name=""/>
+        <p:cNvPr id="1" name="">
+          <a:extLst>
+            <a:ext uri="{FF2B5EF4-FFF2-40B4-BE49-F238E27FC236}">
+              <a16:creationId xmlns:a16="http://schemas.microsoft.com/office/drawing/2014/main" id="{60857A89-1F77-578B-A27F-AB48E38DDC67}"/>
+            </a:ext>
+          </a:extLst>
+        </p:cNvPr>
         <p:cNvGrpSpPr/>
         <p:nvPr/>
       </p:nvGrpSpPr>
@@ -24694,10 +24711,107 @@
       </p:grpSpPr>
       <p:sp>
         <p:nvSpPr>
-          <p:cNvPr id="2" name="Tytuł 1">
+          <p:cNvPr id="4" name="Tytuł 3">
             <a:extLst>
               <a:ext uri="{FF2B5EF4-FFF2-40B4-BE49-F238E27FC236}">
-                <a16:creationId xmlns:a16="http://schemas.microsoft.com/office/drawing/2014/main" id="{FE7E4554-8151-E1F4-329A-C95C4CCD029C}"/>
+                <a16:creationId xmlns:a16="http://schemas.microsoft.com/office/drawing/2014/main" id="{7CE0C927-0B1B-CD58-EE0A-7BD625E93BA2}"/>
+              </a:ext>
+            </a:extLst>
+          </p:cNvPr>
+          <p:cNvSpPr>
+            <a:spLocks noGrp="1"/>
+          </p:cNvSpPr>
+          <p:nvPr>
+            <p:ph type="title"/>
+          </p:nvPr>
+        </p:nvSpPr>
+        <p:spPr/>
+        <p:txBody>
+          <a:bodyPr/>
+          <a:lstStyle/>
+          <a:p>
+            <a:r>
+              <a:rPr lang="pl-PL" dirty="0"/>
+              <a:t>Basic </a:t>
+            </a:r>
+            <a:r>
+              <a:rPr lang="pl-PL" dirty="0" err="1"/>
+              <a:t>Regression</a:t>
+            </a:r>
+            <a:endParaRPr lang="pl-PL" dirty="0"/>
+          </a:p>
+        </p:txBody>
+      </p:sp>
+      <p:pic>
+        <p:nvPicPr>
+          <p:cNvPr id="7" name="Symbol zastępczy zawartości 6">
+            <a:extLst>
+              <a:ext uri="{FF2B5EF4-FFF2-40B4-BE49-F238E27FC236}">
+                <a16:creationId xmlns:a16="http://schemas.microsoft.com/office/drawing/2014/main" id="{E4CB475E-1FBE-DC8D-06CD-2B44D2E408A1}"/>
+              </a:ext>
+            </a:extLst>
+          </p:cNvPr>
+          <p:cNvPicPr>
+            <a:picLocks noGrp="1" noChangeAspect="1"/>
+          </p:cNvPicPr>
+          <p:nvPr>
+            <p:ph idx="1"/>
+          </p:nvPr>
+        </p:nvPicPr>
+        <p:blipFill>
+          <a:blip r:embed="rId2"/>
+          <a:srcRect/>
+          <a:stretch/>
+        </p:blipFill>
+        <p:spPr>
+          <a:xfrm>
+            <a:off x="766427" y="1690688"/>
+            <a:ext cx="10515600" cy="4685168"/>
+          </a:xfrm>
+        </p:spPr>
+      </p:pic>
+    </p:spTree>
+    <p:extLst>
+      <p:ext uri="{BB962C8B-B14F-4D97-AF65-F5344CB8AC3E}">
+        <p14:creationId xmlns:p14="http://schemas.microsoft.com/office/powerpoint/2010/main" val="2570654477"/>
+      </p:ext>
+    </p:extLst>
+  </p:cSld>
+  <p:clrMapOvr>
+    <a:masterClrMapping/>
+  </p:clrMapOvr>
+</p:sld>
+</file>
+
+<file path=ppt/slides/slide11.xml><?xml version="1.0" encoding="utf-8"?>
+<p:sld xmlns:a="http://schemas.openxmlformats.org/drawingml/2006/main" xmlns:r="http://schemas.openxmlformats.org/officeDocument/2006/relationships" xmlns:p="http://schemas.openxmlformats.org/presentationml/2006/main">
+  <p:cSld>
+    <p:spTree>
+      <p:nvGrpSpPr>
+        <p:cNvPr id="1" name="">
+          <a:extLst>
+            <a:ext uri="{FF2B5EF4-FFF2-40B4-BE49-F238E27FC236}">
+              <a16:creationId xmlns:a16="http://schemas.microsoft.com/office/drawing/2014/main" id="{C05A7E02-75A6-BE20-214D-88A855EF0A13}"/>
+            </a:ext>
+          </a:extLst>
+        </p:cNvPr>
+        <p:cNvGrpSpPr/>
+        <p:nvPr/>
+      </p:nvGrpSpPr>
+      <p:grpSpPr>
+        <a:xfrm>
+          <a:off x="0" y="0"/>
+          <a:ext cx="0" cy="0"/>
+          <a:chOff x="0" y="0"/>
+          <a:chExt cx="0" cy="0"/>
+        </a:xfrm>
+      </p:grpSpPr>
+      <p:sp>
+        <p:nvSpPr>
+          <p:cNvPr id="4" name="Tytuł 3">
+            <a:extLst>
+              <a:ext uri="{FF2B5EF4-FFF2-40B4-BE49-F238E27FC236}">
+                <a16:creationId xmlns:a16="http://schemas.microsoft.com/office/drawing/2014/main" id="{724E370D-7651-545C-66AA-A968FA85497F}"/>
               </a:ext>
             </a:extLst>
           </p:cNvPr>
@@ -24719,41 +24833,44 @@
             </a:r>
             <a:r>
               <a:rPr lang="pl-PL" dirty="0" err="1"/>
-              <a:t>Models</a:t>
+              <a:t>Regression</a:t>
             </a:r>
             <a:endParaRPr lang="pl-PL" dirty="0"/>
           </a:p>
         </p:txBody>
       </p:sp>
-      <p:sp>
-        <p:nvSpPr>
-          <p:cNvPr id="3" name="Symbol zastępczy zawartości 2">
+      <p:pic>
+        <p:nvPicPr>
+          <p:cNvPr id="7" name="Symbol zastępczy zawartości 6">
             <a:extLst>
               <a:ext uri="{FF2B5EF4-FFF2-40B4-BE49-F238E27FC236}">
-                <a16:creationId xmlns:a16="http://schemas.microsoft.com/office/drawing/2014/main" id="{5D432722-E798-925C-7BF7-51C9269CAA24}"/>
+                <a16:creationId xmlns:a16="http://schemas.microsoft.com/office/drawing/2014/main" id="{2DAF8787-2725-0C80-4520-88767BFC5EA6}"/>
               </a:ext>
             </a:extLst>
           </p:cNvPr>
-          <p:cNvSpPr>
-            <a:spLocks noGrp="1"/>
-          </p:cNvSpPr>
+          <p:cNvPicPr>
+            <a:picLocks noGrp="1" noChangeAspect="1"/>
+          </p:cNvPicPr>
           <p:nvPr>
             <p:ph idx="1"/>
           </p:nvPr>
-        </p:nvSpPr>
-        <p:spPr/>
-        <p:txBody>
-          <a:bodyPr/>
-          <a:lstStyle/>
-          <a:p>
-            <a:endParaRPr lang="pl-PL"/>
-          </a:p>
-        </p:txBody>
-      </p:sp>
+        </p:nvPicPr>
+        <p:blipFill>
+          <a:blip r:embed="rId2"/>
+          <a:srcRect/>
+          <a:stretch/>
+        </p:blipFill>
+        <p:spPr>
+          <a:xfrm>
+            <a:off x="766427" y="1690688"/>
+            <a:ext cx="10515600" cy="4685168"/>
+          </a:xfrm>
+        </p:spPr>
+      </p:pic>
     </p:spTree>
     <p:extLst>
       <p:ext uri="{BB962C8B-B14F-4D97-AF65-F5344CB8AC3E}">
-        <p14:creationId xmlns:p14="http://schemas.microsoft.com/office/powerpoint/2010/main" val="1776657588"/>
+        <p14:creationId xmlns:p14="http://schemas.microsoft.com/office/powerpoint/2010/main" val="3525290793"/>
       </p:ext>
     </p:extLst>
   </p:cSld>
@@ -24763,7 +24880,542 @@
 </p:sld>
 </file>
 
-<file path=ppt/slides/slide11.xml><?xml version="1.0" encoding="utf-8"?>
+<file path=ppt/slides/slide12.xml><?xml version="1.0" encoding="utf-8"?>
+<p:sld xmlns:a="http://schemas.openxmlformats.org/drawingml/2006/main" xmlns:r="http://schemas.openxmlformats.org/officeDocument/2006/relationships" xmlns:p="http://schemas.openxmlformats.org/presentationml/2006/main">
+  <p:cSld>
+    <p:spTree>
+      <p:nvGrpSpPr>
+        <p:cNvPr id="1" name="">
+          <a:extLst>
+            <a:ext uri="{FF2B5EF4-FFF2-40B4-BE49-F238E27FC236}">
+              <a16:creationId xmlns:a16="http://schemas.microsoft.com/office/drawing/2014/main" id="{9869B6C4-9FA3-1E57-1930-6F87870483DA}"/>
+            </a:ext>
+          </a:extLst>
+        </p:cNvPr>
+        <p:cNvGrpSpPr/>
+        <p:nvPr/>
+      </p:nvGrpSpPr>
+      <p:grpSpPr>
+        <a:xfrm>
+          <a:off x="0" y="0"/>
+          <a:ext cx="0" cy="0"/>
+          <a:chOff x="0" y="0"/>
+          <a:chExt cx="0" cy="0"/>
+        </a:xfrm>
+      </p:grpSpPr>
+      <p:sp>
+        <p:nvSpPr>
+          <p:cNvPr id="4" name="Tytuł 3">
+            <a:extLst>
+              <a:ext uri="{FF2B5EF4-FFF2-40B4-BE49-F238E27FC236}">
+                <a16:creationId xmlns:a16="http://schemas.microsoft.com/office/drawing/2014/main" id="{83AA732B-3BA1-1B25-A9CC-E025D7DAFC30}"/>
+              </a:ext>
+            </a:extLst>
+          </p:cNvPr>
+          <p:cNvSpPr>
+            <a:spLocks noGrp="1"/>
+          </p:cNvSpPr>
+          <p:nvPr>
+            <p:ph type="title"/>
+          </p:nvPr>
+        </p:nvSpPr>
+        <p:spPr/>
+        <p:txBody>
+          <a:bodyPr/>
+          <a:lstStyle/>
+          <a:p>
+            <a:r>
+              <a:rPr lang="pl-PL" dirty="0"/>
+              <a:t>Basic </a:t>
+            </a:r>
+            <a:r>
+              <a:rPr lang="pl-PL" dirty="0" err="1"/>
+              <a:t>Classification</a:t>
+            </a:r>
+            <a:endParaRPr lang="pl-PL" dirty="0"/>
+          </a:p>
+        </p:txBody>
+      </p:sp>
+      <p:pic>
+        <p:nvPicPr>
+          <p:cNvPr id="7" name="Symbol zastępczy zawartości 6">
+            <a:extLst>
+              <a:ext uri="{FF2B5EF4-FFF2-40B4-BE49-F238E27FC236}">
+                <a16:creationId xmlns:a16="http://schemas.microsoft.com/office/drawing/2014/main" id="{C8E1DB6B-172C-F645-A11D-A8254E3426BD}"/>
+              </a:ext>
+            </a:extLst>
+          </p:cNvPr>
+          <p:cNvPicPr>
+            <a:picLocks noGrp="1" noChangeAspect="1"/>
+          </p:cNvPicPr>
+          <p:nvPr>
+            <p:ph idx="1"/>
+          </p:nvPr>
+        </p:nvPicPr>
+        <p:blipFill>
+          <a:blip r:embed="rId2"/>
+          <a:srcRect/>
+          <a:stretch/>
+        </p:blipFill>
+        <p:spPr>
+          <a:xfrm>
+            <a:off x="766427" y="1690688"/>
+            <a:ext cx="10515600" cy="4685168"/>
+          </a:xfrm>
+        </p:spPr>
+      </p:pic>
+    </p:spTree>
+    <p:extLst>
+      <p:ext uri="{BB962C8B-B14F-4D97-AF65-F5344CB8AC3E}">
+        <p14:creationId xmlns:p14="http://schemas.microsoft.com/office/powerpoint/2010/main" val="1083167463"/>
+      </p:ext>
+    </p:extLst>
+  </p:cSld>
+  <p:clrMapOvr>
+    <a:masterClrMapping/>
+  </p:clrMapOvr>
+</p:sld>
+</file>
+
+<file path=ppt/slides/slide13.xml><?xml version="1.0" encoding="utf-8"?>
+<p:sld xmlns:a="http://schemas.openxmlformats.org/drawingml/2006/main" xmlns:r="http://schemas.openxmlformats.org/officeDocument/2006/relationships" xmlns:p="http://schemas.openxmlformats.org/presentationml/2006/main">
+  <p:cSld>
+    <p:spTree>
+      <p:nvGrpSpPr>
+        <p:cNvPr id="1" name="">
+          <a:extLst>
+            <a:ext uri="{FF2B5EF4-FFF2-40B4-BE49-F238E27FC236}">
+              <a16:creationId xmlns:a16="http://schemas.microsoft.com/office/drawing/2014/main" id="{9402BB17-7D56-880C-225E-31CDE2C7A03F}"/>
+            </a:ext>
+          </a:extLst>
+        </p:cNvPr>
+        <p:cNvGrpSpPr/>
+        <p:nvPr/>
+      </p:nvGrpSpPr>
+      <p:grpSpPr>
+        <a:xfrm>
+          <a:off x="0" y="0"/>
+          <a:ext cx="0" cy="0"/>
+          <a:chOff x="0" y="0"/>
+          <a:chExt cx="0" cy="0"/>
+        </a:xfrm>
+      </p:grpSpPr>
+      <p:sp>
+        <p:nvSpPr>
+          <p:cNvPr id="4" name="Tytuł 3">
+            <a:extLst>
+              <a:ext uri="{FF2B5EF4-FFF2-40B4-BE49-F238E27FC236}">
+                <a16:creationId xmlns:a16="http://schemas.microsoft.com/office/drawing/2014/main" id="{BB3F1963-1F9D-8186-7818-188333157BD1}"/>
+              </a:ext>
+            </a:extLst>
+          </p:cNvPr>
+          <p:cNvSpPr>
+            <a:spLocks noGrp="1"/>
+          </p:cNvSpPr>
+          <p:nvPr>
+            <p:ph type="title"/>
+          </p:nvPr>
+        </p:nvSpPr>
+        <p:spPr/>
+        <p:txBody>
+          <a:bodyPr/>
+          <a:lstStyle/>
+          <a:p>
+            <a:r>
+              <a:rPr lang="pl-PL" dirty="0"/>
+              <a:t>Advanced </a:t>
+            </a:r>
+            <a:r>
+              <a:rPr lang="pl-PL" dirty="0" err="1"/>
+              <a:t>Classification</a:t>
+            </a:r>
+            <a:endParaRPr lang="pl-PL" dirty="0"/>
+          </a:p>
+        </p:txBody>
+      </p:sp>
+      <p:pic>
+        <p:nvPicPr>
+          <p:cNvPr id="7" name="Symbol zastępczy zawartości 6">
+            <a:extLst>
+              <a:ext uri="{FF2B5EF4-FFF2-40B4-BE49-F238E27FC236}">
+                <a16:creationId xmlns:a16="http://schemas.microsoft.com/office/drawing/2014/main" id="{98B902C4-570C-0B38-D79E-F84081CC3397}"/>
+              </a:ext>
+            </a:extLst>
+          </p:cNvPr>
+          <p:cNvPicPr>
+            <a:picLocks noGrp="1" noChangeAspect="1"/>
+          </p:cNvPicPr>
+          <p:nvPr>
+            <p:ph idx="1"/>
+          </p:nvPr>
+        </p:nvPicPr>
+        <p:blipFill>
+          <a:blip r:embed="rId2"/>
+          <a:srcRect/>
+          <a:stretch/>
+        </p:blipFill>
+        <p:spPr>
+          <a:xfrm>
+            <a:off x="766427" y="1690688"/>
+            <a:ext cx="10515600" cy="4685168"/>
+          </a:xfrm>
+        </p:spPr>
+      </p:pic>
+    </p:spTree>
+    <p:extLst>
+      <p:ext uri="{BB962C8B-B14F-4D97-AF65-F5344CB8AC3E}">
+        <p14:creationId xmlns:p14="http://schemas.microsoft.com/office/powerpoint/2010/main" val="2635228805"/>
+      </p:ext>
+    </p:extLst>
+  </p:cSld>
+  <p:clrMapOvr>
+    <a:masterClrMapping/>
+  </p:clrMapOvr>
+</p:sld>
+</file>
+
+<file path=ppt/slides/slide14.xml><?xml version="1.0" encoding="utf-8"?>
+<p:sld xmlns:a="http://schemas.openxmlformats.org/drawingml/2006/main" xmlns:r="http://schemas.openxmlformats.org/officeDocument/2006/relationships" xmlns:p="http://schemas.openxmlformats.org/presentationml/2006/main">
+  <p:cSld>
+    <p:spTree>
+      <p:nvGrpSpPr>
+        <p:cNvPr id="1" name="">
+          <a:extLst>
+            <a:ext uri="{FF2B5EF4-FFF2-40B4-BE49-F238E27FC236}">
+              <a16:creationId xmlns:a16="http://schemas.microsoft.com/office/drawing/2014/main" id="{7529BFB5-84C0-87AE-3DA5-077CD7B2A5D4}"/>
+            </a:ext>
+          </a:extLst>
+        </p:cNvPr>
+        <p:cNvGrpSpPr/>
+        <p:nvPr/>
+      </p:nvGrpSpPr>
+      <p:grpSpPr>
+        <a:xfrm>
+          <a:off x="0" y="0"/>
+          <a:ext cx="0" cy="0"/>
+          <a:chOff x="0" y="0"/>
+          <a:chExt cx="0" cy="0"/>
+        </a:xfrm>
+      </p:grpSpPr>
+      <p:sp>
+        <p:nvSpPr>
+          <p:cNvPr id="4" name="Tytuł 3">
+            <a:extLst>
+              <a:ext uri="{FF2B5EF4-FFF2-40B4-BE49-F238E27FC236}">
+                <a16:creationId xmlns:a16="http://schemas.microsoft.com/office/drawing/2014/main" id="{93F4A0DB-CA01-B357-96BB-1435DFD97251}"/>
+              </a:ext>
+            </a:extLst>
+          </p:cNvPr>
+          <p:cNvSpPr>
+            <a:spLocks noGrp="1"/>
+          </p:cNvSpPr>
+          <p:nvPr>
+            <p:ph type="title"/>
+          </p:nvPr>
+        </p:nvSpPr>
+        <p:spPr/>
+        <p:txBody>
+          <a:bodyPr/>
+          <a:lstStyle/>
+          <a:p>
+            <a:r>
+              <a:rPr lang="pl-PL" dirty="0"/>
+              <a:t>Basic </a:t>
+            </a:r>
+            <a:r>
+              <a:rPr lang="pl-PL" dirty="0" err="1"/>
+              <a:t>Regression</a:t>
+            </a:r>
+            <a:endParaRPr lang="pl-PL" dirty="0"/>
+          </a:p>
+        </p:txBody>
+      </p:sp>
+      <p:pic>
+        <p:nvPicPr>
+          <p:cNvPr id="7" name="Symbol zastępczy zawartości 6">
+            <a:extLst>
+              <a:ext uri="{FF2B5EF4-FFF2-40B4-BE49-F238E27FC236}">
+                <a16:creationId xmlns:a16="http://schemas.microsoft.com/office/drawing/2014/main" id="{1FCFCCEE-5A06-86DA-47DB-3D2B9D9FC3F0}"/>
+              </a:ext>
+            </a:extLst>
+          </p:cNvPr>
+          <p:cNvPicPr>
+            <a:picLocks noGrp="1" noChangeAspect="1"/>
+          </p:cNvPicPr>
+          <p:nvPr>
+            <p:ph idx="1"/>
+          </p:nvPr>
+        </p:nvPicPr>
+        <p:blipFill>
+          <a:blip r:embed="rId2"/>
+          <a:srcRect/>
+          <a:stretch/>
+        </p:blipFill>
+        <p:spPr>
+          <a:xfrm>
+            <a:off x="766427" y="1690688"/>
+            <a:ext cx="10515600" cy="4685168"/>
+          </a:xfrm>
+        </p:spPr>
+      </p:pic>
+    </p:spTree>
+    <p:extLst>
+      <p:ext uri="{BB962C8B-B14F-4D97-AF65-F5344CB8AC3E}">
+        <p14:creationId xmlns:p14="http://schemas.microsoft.com/office/powerpoint/2010/main" val="2473407403"/>
+      </p:ext>
+    </p:extLst>
+  </p:cSld>
+  <p:clrMapOvr>
+    <a:masterClrMapping/>
+  </p:clrMapOvr>
+</p:sld>
+</file>
+
+<file path=ppt/slides/slide15.xml><?xml version="1.0" encoding="utf-8"?>
+<p:sld xmlns:a="http://schemas.openxmlformats.org/drawingml/2006/main" xmlns:r="http://schemas.openxmlformats.org/officeDocument/2006/relationships" xmlns:p="http://schemas.openxmlformats.org/presentationml/2006/main">
+  <p:cSld>
+    <p:spTree>
+      <p:nvGrpSpPr>
+        <p:cNvPr id="1" name="">
+          <a:extLst>
+            <a:ext uri="{FF2B5EF4-FFF2-40B4-BE49-F238E27FC236}">
+              <a16:creationId xmlns:a16="http://schemas.microsoft.com/office/drawing/2014/main" id="{AFCFC9A4-AD3E-CABC-CB2E-B87DF7DF59E5}"/>
+            </a:ext>
+          </a:extLst>
+        </p:cNvPr>
+        <p:cNvGrpSpPr/>
+        <p:nvPr/>
+      </p:nvGrpSpPr>
+      <p:grpSpPr>
+        <a:xfrm>
+          <a:off x="0" y="0"/>
+          <a:ext cx="0" cy="0"/>
+          <a:chOff x="0" y="0"/>
+          <a:chExt cx="0" cy="0"/>
+        </a:xfrm>
+      </p:grpSpPr>
+      <p:sp>
+        <p:nvSpPr>
+          <p:cNvPr id="4" name="Tytuł 3">
+            <a:extLst>
+              <a:ext uri="{FF2B5EF4-FFF2-40B4-BE49-F238E27FC236}">
+                <a16:creationId xmlns:a16="http://schemas.microsoft.com/office/drawing/2014/main" id="{25CE1B63-CE0D-EDDE-CB97-F0A0B7533F13}"/>
+              </a:ext>
+            </a:extLst>
+          </p:cNvPr>
+          <p:cNvSpPr>
+            <a:spLocks noGrp="1"/>
+          </p:cNvSpPr>
+          <p:nvPr>
+            <p:ph type="title"/>
+          </p:nvPr>
+        </p:nvSpPr>
+        <p:spPr/>
+        <p:txBody>
+          <a:bodyPr/>
+          <a:lstStyle/>
+          <a:p>
+            <a:r>
+              <a:rPr lang="pl-PL" dirty="0"/>
+              <a:t>Advanced </a:t>
+            </a:r>
+            <a:r>
+              <a:rPr lang="pl-PL" dirty="0" err="1"/>
+              <a:t>Regression</a:t>
+            </a:r>
+            <a:endParaRPr lang="pl-PL" dirty="0"/>
+          </a:p>
+        </p:txBody>
+      </p:sp>
+      <p:pic>
+        <p:nvPicPr>
+          <p:cNvPr id="7" name="Symbol zastępczy zawartości 6">
+            <a:extLst>
+              <a:ext uri="{FF2B5EF4-FFF2-40B4-BE49-F238E27FC236}">
+                <a16:creationId xmlns:a16="http://schemas.microsoft.com/office/drawing/2014/main" id="{CE98535E-1696-F0E9-D087-AE44C12E4CD1}"/>
+              </a:ext>
+            </a:extLst>
+          </p:cNvPr>
+          <p:cNvPicPr>
+            <a:picLocks noGrp="1" noChangeAspect="1"/>
+          </p:cNvPicPr>
+          <p:nvPr>
+            <p:ph idx="1"/>
+          </p:nvPr>
+        </p:nvPicPr>
+        <p:blipFill>
+          <a:blip r:embed="rId2"/>
+          <a:srcRect/>
+          <a:stretch/>
+        </p:blipFill>
+        <p:spPr>
+          <a:xfrm>
+            <a:off x="766427" y="1690688"/>
+            <a:ext cx="10515600" cy="4685168"/>
+          </a:xfrm>
+        </p:spPr>
+      </p:pic>
+    </p:spTree>
+    <p:extLst>
+      <p:ext uri="{BB962C8B-B14F-4D97-AF65-F5344CB8AC3E}">
+        <p14:creationId xmlns:p14="http://schemas.microsoft.com/office/powerpoint/2010/main" val="1261325723"/>
+      </p:ext>
+    </p:extLst>
+  </p:cSld>
+  <p:clrMapOvr>
+    <a:masterClrMapping/>
+  </p:clrMapOvr>
+</p:sld>
+</file>
+
+<file path=ppt/slides/slide16.xml><?xml version="1.0" encoding="utf-8"?>
+<p:sld xmlns:a="http://schemas.openxmlformats.org/drawingml/2006/main" xmlns:r="http://schemas.openxmlformats.org/officeDocument/2006/relationships" xmlns:p="http://schemas.openxmlformats.org/presentationml/2006/main">
+  <p:cSld>
+    <p:spTree>
+      <p:nvGrpSpPr>
+        <p:cNvPr id="1" name="">
+          <a:extLst>
+            <a:ext uri="{FF2B5EF4-FFF2-40B4-BE49-F238E27FC236}">
+              <a16:creationId xmlns:a16="http://schemas.microsoft.com/office/drawing/2014/main" id="{C97ED8C2-C951-C88B-75CF-7F358E2B235D}"/>
+            </a:ext>
+          </a:extLst>
+        </p:cNvPr>
+        <p:cNvGrpSpPr/>
+        <p:nvPr/>
+      </p:nvGrpSpPr>
+      <p:grpSpPr>
+        <a:xfrm>
+          <a:off x="0" y="0"/>
+          <a:ext cx="0" cy="0"/>
+          <a:chOff x="0" y="0"/>
+          <a:chExt cx="0" cy="0"/>
+        </a:xfrm>
+      </p:grpSpPr>
+      <p:sp>
+        <p:nvSpPr>
+          <p:cNvPr id="2" name="Tytuł 1">
+            <a:extLst>
+              <a:ext uri="{FF2B5EF4-FFF2-40B4-BE49-F238E27FC236}">
+                <a16:creationId xmlns:a16="http://schemas.microsoft.com/office/drawing/2014/main" id="{136DDEAD-106D-F98F-26FB-E4CFBBE02A6B}"/>
+              </a:ext>
+            </a:extLst>
+          </p:cNvPr>
+          <p:cNvSpPr>
+            <a:spLocks noGrp="1"/>
+          </p:cNvSpPr>
+          <p:nvPr>
+            <p:ph type="ctrTitle"/>
+          </p:nvPr>
+        </p:nvSpPr>
+        <p:spPr>
+          <a:xfrm>
+            <a:off x="1708297" y="3029669"/>
+            <a:ext cx="8775405" cy="798661"/>
+          </a:xfrm>
+        </p:spPr>
+        <p:txBody>
+          <a:bodyPr>
+            <a:normAutofit/>
+          </a:bodyPr>
+          <a:lstStyle/>
+          <a:p>
+            <a:r>
+              <a:rPr lang="pl-PL" sz="4800" dirty="0" err="1">
+                <a:solidFill>
+                  <a:srgbClr val="0E0E0E"/>
+                </a:solidFill>
+                <a:effectLst/>
+                <a:latin typeface=".AppleSystemUIFont"/>
+              </a:rPr>
+              <a:t>What</a:t>
+            </a:r>
+            <a:r>
+              <a:rPr lang="pl-PL" sz="4800" dirty="0">
+                <a:solidFill>
+                  <a:srgbClr val="0E0E0E"/>
+                </a:solidFill>
+                <a:effectLst/>
+                <a:latin typeface=".AppleSystemUIFont"/>
+              </a:rPr>
+              <a:t> </a:t>
+            </a:r>
+            <a:r>
+              <a:rPr lang="pl-PL" sz="4800" dirty="0" err="1">
+                <a:solidFill>
+                  <a:srgbClr val="0E0E0E"/>
+                </a:solidFill>
+                <a:effectLst/>
+                <a:latin typeface=".AppleSystemUIFont"/>
+              </a:rPr>
+              <a:t>conclusions</a:t>
+            </a:r>
+            <a:r>
+              <a:rPr lang="pl-PL" sz="4800" dirty="0">
+                <a:solidFill>
+                  <a:srgbClr val="0E0E0E"/>
+                </a:solidFill>
+                <a:effectLst/>
+                <a:latin typeface=".AppleSystemUIFont"/>
+              </a:rPr>
+              <a:t> </a:t>
+            </a:r>
+            <a:r>
+              <a:rPr lang="pl-PL" sz="4800" dirty="0" err="1">
+                <a:solidFill>
+                  <a:srgbClr val="0E0E0E"/>
+                </a:solidFill>
+                <a:effectLst/>
+                <a:latin typeface=".AppleSystemUIFont"/>
+              </a:rPr>
+              <a:t>can</a:t>
+            </a:r>
+            <a:r>
+              <a:rPr lang="pl-PL" sz="4800" dirty="0">
+                <a:solidFill>
+                  <a:srgbClr val="0E0E0E"/>
+                </a:solidFill>
+                <a:effectLst/>
+                <a:latin typeface=".AppleSystemUIFont"/>
+              </a:rPr>
+              <a:t> be </a:t>
+            </a:r>
+            <a:r>
+              <a:rPr lang="pl-PL" sz="4800" dirty="0" err="1">
+                <a:solidFill>
+                  <a:srgbClr val="0E0E0E"/>
+                </a:solidFill>
+                <a:effectLst/>
+                <a:latin typeface=".AppleSystemUIFont"/>
+              </a:rPr>
+              <a:t>drawn</a:t>
+            </a:r>
+            <a:r>
+              <a:rPr lang="pl-PL" sz="4800" dirty="0">
+                <a:solidFill>
+                  <a:srgbClr val="0E0E0E"/>
+                </a:solidFill>
+                <a:effectLst/>
+                <a:latin typeface=".AppleSystemUIFont"/>
+              </a:rPr>
+              <a:t>?</a:t>
+            </a:r>
+          </a:p>
+        </p:txBody>
+      </p:sp>
+    </p:spTree>
+    <p:extLst>
+      <p:ext uri="{BB962C8B-B14F-4D97-AF65-F5344CB8AC3E}">
+        <p14:creationId xmlns:p14="http://schemas.microsoft.com/office/powerpoint/2010/main" val="2445879558"/>
+      </p:ext>
+    </p:extLst>
+  </p:cSld>
+  <p:clrMapOvr>
+    <a:masterClrMapping/>
+  </p:clrMapOvr>
+</p:sld>
+</file>
+
+<file path=ppt/slides/slide17.xml><?xml version="1.0" encoding="utf-8"?>
 <p:sld xmlns:a="http://schemas.openxmlformats.org/drawingml/2006/main" xmlns:r="http://schemas.openxmlformats.org/officeDocument/2006/relationships" xmlns:p="http://schemas.openxmlformats.org/presentationml/2006/main">
   <p:cSld>
     <p:spTree>
@@ -24785,7 +25437,7 @@
           <p:cNvPr id="2" name="Tytuł 1">
             <a:extLst>
               <a:ext uri="{FF2B5EF4-FFF2-40B4-BE49-F238E27FC236}">
-                <a16:creationId xmlns:a16="http://schemas.microsoft.com/office/drawing/2014/main" id="{0B2176FE-CAAB-3516-F700-809403731A4E}"/>
+                <a16:creationId xmlns:a16="http://schemas.microsoft.com/office/drawing/2014/main" id="{C4031975-4909-AC99-C4EA-4A6E7BF2E263}"/>
               </a:ext>
             </a:extLst>
           </p:cNvPr>
@@ -24796,14 +25448,28 @@
             <p:ph type="title"/>
           </p:nvPr>
         </p:nvSpPr>
-        <p:spPr/>
+        <p:spPr>
+          <a:xfrm>
+            <a:off x="839788" y="365125"/>
+            <a:ext cx="10515600" cy="1325563"/>
+          </a:xfrm>
+        </p:spPr>
         <p:txBody>
           <a:bodyPr/>
           <a:lstStyle/>
           <a:p>
+            <a:pPr algn="ctr"/>
             <a:r>
               <a:rPr lang="pl-PL" dirty="0"/>
-              <a:t>Basic vs Advanced </a:t>
+              <a:t>Problem </a:t>
+            </a:r>
+            <a:r>
+              <a:rPr lang="pl-PL" dirty="0" err="1"/>
+              <a:t>Type</a:t>
+            </a:r>
+            <a:r>
+              <a:rPr lang="pl-PL" dirty="0"/>
+              <a:t> </a:t>
             </a:r>
             <a:r>
               <a:rPr lang="pl-PL" dirty="0" err="1"/>
@@ -24815,10 +25481,10 @@
       </p:sp>
       <p:sp>
         <p:nvSpPr>
-          <p:cNvPr id="3" name="Symbol zastępczy zawartości 2">
+          <p:cNvPr id="6" name="Symbol zastępczy tekstu 5">
             <a:extLst>
               <a:ext uri="{FF2B5EF4-FFF2-40B4-BE49-F238E27FC236}">
-                <a16:creationId xmlns:a16="http://schemas.microsoft.com/office/drawing/2014/main" id="{9E78D914-CBA5-2516-C578-A4B956DD7D7E}"/>
+                <a16:creationId xmlns:a16="http://schemas.microsoft.com/office/drawing/2014/main" id="{308CDEFD-266C-3C7F-22FF-88615DFD12D4}"/>
               </a:ext>
             </a:extLst>
           </p:cNvPr>
@@ -24826,7 +25492,81 @@
             <a:spLocks noGrp="1"/>
           </p:cNvSpPr>
           <p:nvPr>
-            <p:ph idx="1"/>
+            <p:ph type="body" idx="1"/>
+          </p:nvPr>
+        </p:nvSpPr>
+        <p:spPr>
+          <a:xfrm>
+            <a:off x="839788" y="1681163"/>
+            <a:ext cx="5157787" cy="823912"/>
+          </a:xfrm>
+        </p:spPr>
+        <p:txBody>
+          <a:bodyPr anchor="t">
+            <a:normAutofit/>
+          </a:bodyPr>
+          <a:lstStyle/>
+          <a:p>
+            <a:pPr algn="ctr"/>
+            <a:r>
+              <a:rPr lang="pl-PL" sz="3600" dirty="0" err="1"/>
+              <a:t>Classification</a:t>
+            </a:r>
+            <a:endParaRPr lang="pl-PL" sz="3600" dirty="0"/>
+          </a:p>
+        </p:txBody>
+      </p:sp>
+      <p:sp>
+        <p:nvSpPr>
+          <p:cNvPr id="8" name="Symbol zastępczy tekstu 7">
+            <a:extLst>
+              <a:ext uri="{FF2B5EF4-FFF2-40B4-BE49-F238E27FC236}">
+                <a16:creationId xmlns:a16="http://schemas.microsoft.com/office/drawing/2014/main" id="{196CB512-7A0A-3C0F-8E75-5B538C8DA80A}"/>
+              </a:ext>
+            </a:extLst>
+          </p:cNvPr>
+          <p:cNvSpPr>
+            <a:spLocks noGrp="1"/>
+          </p:cNvSpPr>
+          <p:nvPr>
+            <p:ph type="body" sz="quarter" idx="3"/>
+          </p:nvPr>
+        </p:nvSpPr>
+        <p:spPr>
+          <a:xfrm>
+            <a:off x="6172200" y="1681163"/>
+            <a:ext cx="5183188" cy="823912"/>
+          </a:xfrm>
+        </p:spPr>
+        <p:txBody>
+          <a:bodyPr anchor="t">
+            <a:normAutofit/>
+          </a:bodyPr>
+          <a:lstStyle/>
+          <a:p>
+            <a:pPr algn="ctr"/>
+            <a:r>
+              <a:rPr lang="pl-PL" sz="3600" dirty="0" err="1"/>
+              <a:t>Regression</a:t>
+            </a:r>
+            <a:endParaRPr lang="pl-PL" sz="3600" dirty="0"/>
+          </a:p>
+        </p:txBody>
+      </p:sp>
+      <p:sp>
+        <p:nvSpPr>
+          <p:cNvPr id="20" name="Symbol zastępczy zawartości 19">
+            <a:extLst>
+              <a:ext uri="{FF2B5EF4-FFF2-40B4-BE49-F238E27FC236}">
+                <a16:creationId xmlns:a16="http://schemas.microsoft.com/office/drawing/2014/main" id="{876937F9-E911-954B-E14A-23C83C1B5161}"/>
+              </a:ext>
+            </a:extLst>
+          </p:cNvPr>
+          <p:cNvSpPr>
+            <a:spLocks noGrp="1"/>
+          </p:cNvSpPr>
+          <p:nvPr>
+            <p:ph sz="half" idx="2"/>
           </p:nvPr>
         </p:nvSpPr>
         <p:spPr/>
@@ -24834,14 +25574,511 @@
           <a:bodyPr/>
           <a:lstStyle/>
           <a:p>
-            <a:endParaRPr lang="pl-PL"/>
+            <a:r>
+              <a:rPr lang="pl-PL" dirty="0"/>
+              <a:t>Lower </a:t>
+            </a:r>
+            <a:r>
+              <a:rPr lang="pl-PL" dirty="0" err="1"/>
+              <a:t>accuracy</a:t>
+            </a:r>
+            <a:endParaRPr lang="pl-PL" dirty="0"/>
+          </a:p>
+          <a:p>
+            <a:r>
+              <a:rPr lang="pl-PL" dirty="0" err="1"/>
+              <a:t>Higher</a:t>
+            </a:r>
+            <a:r>
+              <a:rPr lang="pl-PL" dirty="0"/>
+              <a:t> </a:t>
+            </a:r>
+            <a:r>
+              <a:rPr lang="pl-PL" dirty="0" err="1"/>
+              <a:t>training</a:t>
+            </a:r>
+            <a:r>
+              <a:rPr lang="pl-PL" dirty="0"/>
+              <a:t> </a:t>
+            </a:r>
+            <a:r>
+              <a:rPr lang="pl-PL" dirty="0" err="1"/>
+              <a:t>time</a:t>
+            </a:r>
+            <a:r>
+              <a:rPr lang="pl-PL" dirty="0"/>
+              <a:t> (</a:t>
+            </a:r>
+            <a:r>
+              <a:rPr lang="pl-PL" dirty="0" err="1"/>
+              <a:t>about</a:t>
+            </a:r>
+            <a:r>
+              <a:rPr lang="pl-PL" dirty="0"/>
+              <a:t> 2min)</a:t>
+            </a:r>
+          </a:p>
+          <a:p>
+            <a:r>
+              <a:rPr lang="pl-PL" dirty="0"/>
+              <a:t>The </a:t>
+            </a:r>
+            <a:r>
+              <a:rPr lang="pl-PL" dirty="0" err="1"/>
+              <a:t>result</a:t>
+            </a:r>
+            <a:r>
+              <a:rPr lang="pl-PL" dirty="0"/>
+              <a:t> </a:t>
+            </a:r>
+            <a:r>
+              <a:rPr lang="pl-PL" dirty="0" err="1"/>
+              <a:t>is</a:t>
+            </a:r>
+            <a:r>
+              <a:rPr lang="pl-PL" dirty="0"/>
+              <a:t> not </a:t>
+            </a:r>
+            <a:r>
+              <a:rPr lang="pl-PL" dirty="0" err="1"/>
+              <a:t>direct</a:t>
+            </a:r>
+            <a:r>
+              <a:rPr lang="pl-PL" dirty="0"/>
+              <a:t> but </a:t>
+            </a:r>
+            <a:r>
+              <a:rPr lang="pl-PL" dirty="0" err="1"/>
+              <a:t>takes</a:t>
+            </a:r>
+            <a:r>
+              <a:rPr lang="pl-PL" dirty="0"/>
+              <a:t> a </a:t>
+            </a:r>
+            <a:r>
+              <a:rPr lang="pl-PL" dirty="0" err="1"/>
+              <a:t>range</a:t>
+            </a:r>
+            <a:r>
+              <a:rPr lang="pl-PL" dirty="0"/>
+              <a:t> </a:t>
+            </a:r>
+            <a:r>
+              <a:rPr lang="pl-PL" dirty="0" err="1"/>
+              <a:t>into</a:t>
+            </a:r>
+            <a:r>
+              <a:rPr lang="pl-PL" dirty="0"/>
+              <a:t> </a:t>
+            </a:r>
+            <a:r>
+              <a:rPr lang="pl-PL" dirty="0" err="1"/>
+              <a:t>account</a:t>
+            </a:r>
+            <a:endParaRPr lang="pl-PL" dirty="0"/>
+          </a:p>
+        </p:txBody>
+      </p:sp>
+      <p:sp>
+        <p:nvSpPr>
+          <p:cNvPr id="22" name="Symbol zastępczy zawartości 21">
+            <a:extLst>
+              <a:ext uri="{FF2B5EF4-FFF2-40B4-BE49-F238E27FC236}">
+                <a16:creationId xmlns:a16="http://schemas.microsoft.com/office/drawing/2014/main" id="{4A36E29B-C951-D40A-2B7F-301A530D73C3}"/>
+              </a:ext>
+            </a:extLst>
+          </p:cNvPr>
+          <p:cNvSpPr>
+            <a:spLocks noGrp="1"/>
+          </p:cNvSpPr>
+          <p:nvPr>
+            <p:ph sz="quarter" idx="4"/>
+          </p:nvPr>
+        </p:nvSpPr>
+        <p:spPr/>
+        <p:txBody>
+          <a:bodyPr/>
+          <a:lstStyle/>
+          <a:p>
+            <a:r>
+              <a:rPr lang="pl-PL" dirty="0" err="1"/>
+              <a:t>Higher</a:t>
+            </a:r>
+            <a:r>
+              <a:rPr lang="pl-PL" dirty="0"/>
+              <a:t> </a:t>
+            </a:r>
+            <a:r>
+              <a:rPr lang="pl-PL" dirty="0" err="1"/>
+              <a:t>accuracy</a:t>
+            </a:r>
+            <a:endParaRPr lang="pl-PL" dirty="0"/>
+          </a:p>
+          <a:p>
+            <a:r>
+              <a:rPr lang="pl-PL" dirty="0"/>
+              <a:t>Lower </a:t>
+            </a:r>
+            <a:r>
+              <a:rPr lang="pl-PL" dirty="0" err="1"/>
+              <a:t>training</a:t>
+            </a:r>
+            <a:r>
+              <a:rPr lang="pl-PL" dirty="0"/>
+              <a:t> </a:t>
+            </a:r>
+            <a:r>
+              <a:rPr lang="pl-PL" dirty="0" err="1"/>
+              <a:t>time</a:t>
+            </a:r>
+            <a:r>
+              <a:rPr lang="pl-PL" dirty="0"/>
+              <a:t> (</a:t>
+            </a:r>
+            <a:r>
+              <a:rPr lang="pl-PL" dirty="0" err="1"/>
+              <a:t>about</a:t>
+            </a:r>
+            <a:r>
+              <a:rPr lang="pl-PL" dirty="0"/>
+              <a:t> 30s)</a:t>
+            </a:r>
+          </a:p>
+          <a:p>
+            <a:r>
+              <a:rPr lang="pl-PL" dirty="0">
+                <a:solidFill>
+                  <a:srgbClr val="0E0E0E"/>
+                </a:solidFill>
+                <a:effectLst/>
+                <a:latin typeface=".AppleSystemUIFont"/>
+              </a:rPr>
+              <a:t>The </a:t>
+            </a:r>
+            <a:r>
+              <a:rPr lang="pl-PL" dirty="0" err="1">
+                <a:solidFill>
+                  <a:srgbClr val="0E0E0E"/>
+                </a:solidFill>
+                <a:effectLst/>
+                <a:latin typeface=".AppleSystemUIFont"/>
+              </a:rPr>
+              <a:t>results</a:t>
+            </a:r>
+            <a:r>
+              <a:rPr lang="pl-PL" dirty="0">
+                <a:solidFill>
+                  <a:srgbClr val="0E0E0E"/>
+                </a:solidFill>
+                <a:effectLst/>
+                <a:latin typeface=".AppleSystemUIFont"/>
+              </a:rPr>
+              <a:t> </a:t>
+            </a:r>
+            <a:r>
+              <a:rPr lang="pl-PL" dirty="0" err="1">
+                <a:solidFill>
+                  <a:srgbClr val="0E0E0E"/>
+                </a:solidFill>
+                <a:effectLst/>
+                <a:latin typeface=".AppleSystemUIFont"/>
+              </a:rPr>
+              <a:t>are</a:t>
+            </a:r>
+            <a:r>
+              <a:rPr lang="pl-PL" dirty="0">
+                <a:solidFill>
+                  <a:srgbClr val="0E0E0E"/>
+                </a:solidFill>
+                <a:effectLst/>
+                <a:latin typeface=".AppleSystemUIFont"/>
+              </a:rPr>
+              <a:t> not </a:t>
+            </a:r>
+            <a:r>
+              <a:rPr lang="pl-PL" dirty="0" err="1">
+                <a:solidFill>
+                  <a:srgbClr val="0E0E0E"/>
+                </a:solidFill>
+                <a:effectLst/>
+                <a:latin typeface=".AppleSystemUIFont"/>
+              </a:rPr>
+              <a:t>stable</a:t>
+            </a:r>
+            <a:r>
+              <a:rPr lang="pl-PL" dirty="0">
+                <a:solidFill>
+                  <a:srgbClr val="0E0E0E"/>
+                </a:solidFill>
+                <a:effectLst/>
+                <a:latin typeface=".AppleSystemUIFont"/>
+              </a:rPr>
+              <a:t>, as </a:t>
+            </a:r>
+            <a:r>
+              <a:rPr lang="pl-PL" dirty="0" err="1">
+                <a:solidFill>
+                  <a:srgbClr val="0E0E0E"/>
+                </a:solidFill>
+                <a:effectLst/>
+                <a:latin typeface=".AppleSystemUIFont"/>
+              </a:rPr>
+              <a:t>indicated</a:t>
+            </a:r>
+            <a:r>
+              <a:rPr lang="pl-PL" dirty="0">
+                <a:solidFill>
+                  <a:srgbClr val="0E0E0E"/>
+                </a:solidFill>
+                <a:effectLst/>
+                <a:latin typeface=".AppleSystemUIFont"/>
+              </a:rPr>
+              <a:t> by the high RMSE,  </a:t>
+            </a:r>
+            <a:r>
+              <a:rPr lang="pl-PL" dirty="0" err="1">
+                <a:solidFill>
+                  <a:srgbClr val="0E0E0E"/>
+                </a:solidFill>
+                <a:effectLst/>
+                <a:latin typeface=".AppleSystemUIFont"/>
+              </a:rPr>
+              <a:t>however</a:t>
+            </a:r>
+            <a:r>
+              <a:rPr lang="pl-PL" dirty="0">
+                <a:solidFill>
+                  <a:srgbClr val="0E0E0E"/>
+                </a:solidFill>
+                <a:effectLst/>
+                <a:latin typeface=".AppleSystemUIFont"/>
+              </a:rPr>
+              <a:t>, </a:t>
+            </a:r>
+            <a:r>
+              <a:rPr lang="pl-PL" dirty="0" err="1">
+                <a:solidFill>
+                  <a:srgbClr val="0E0E0E"/>
+                </a:solidFill>
+                <a:effectLst/>
+                <a:latin typeface=".AppleSystemUIFont"/>
+              </a:rPr>
+              <a:t>when</a:t>
+            </a:r>
+            <a:r>
+              <a:rPr lang="pl-PL" dirty="0">
+                <a:solidFill>
+                  <a:srgbClr val="0E0E0E"/>
+                </a:solidFill>
+                <a:effectLst/>
+                <a:latin typeface=".AppleSystemUIFont"/>
+              </a:rPr>
+              <a:t> </a:t>
+            </a:r>
+            <a:r>
+              <a:rPr lang="pl-PL" dirty="0" err="1">
+                <a:solidFill>
+                  <a:srgbClr val="0E0E0E"/>
+                </a:solidFill>
+                <a:effectLst/>
+                <a:latin typeface=".AppleSystemUIFont"/>
+              </a:rPr>
+              <a:t>clustering</a:t>
+            </a:r>
+            <a:r>
+              <a:rPr lang="pl-PL" dirty="0">
+                <a:solidFill>
+                  <a:srgbClr val="0E0E0E"/>
+                </a:solidFill>
+                <a:effectLst/>
+                <a:latin typeface=".AppleSystemUIFont"/>
+              </a:rPr>
+              <a:t> </a:t>
+            </a:r>
+            <a:r>
+              <a:rPr lang="pl-PL" dirty="0" err="1">
+                <a:solidFill>
+                  <a:srgbClr val="0E0E0E"/>
+                </a:solidFill>
+                <a:effectLst/>
+                <a:latin typeface=".AppleSystemUIFont"/>
+              </a:rPr>
+              <a:t>is</a:t>
+            </a:r>
+            <a:r>
+              <a:rPr lang="pl-PL" dirty="0">
+                <a:solidFill>
+                  <a:srgbClr val="0E0E0E"/>
+                </a:solidFill>
+                <a:effectLst/>
+                <a:latin typeface=".AppleSystemUIFont"/>
+              </a:rPr>
+              <a:t> </a:t>
+            </a:r>
+            <a:r>
+              <a:rPr lang="pl-PL" dirty="0" err="1">
+                <a:solidFill>
+                  <a:srgbClr val="0E0E0E"/>
+                </a:solidFill>
+                <a:effectLst/>
+                <a:latin typeface=".AppleSystemUIFont"/>
+              </a:rPr>
+              <a:t>transformed</a:t>
+            </a:r>
+            <a:r>
+              <a:rPr lang="pl-PL" dirty="0">
+                <a:solidFill>
+                  <a:srgbClr val="0E0E0E"/>
+                </a:solidFill>
+                <a:effectLst/>
+                <a:latin typeface=".AppleSystemUIFont"/>
+              </a:rPr>
+              <a:t> </a:t>
+            </a:r>
+            <a:r>
+              <a:rPr lang="pl-PL" dirty="0" err="1">
+                <a:solidFill>
+                  <a:srgbClr val="0E0E0E"/>
+                </a:solidFill>
+                <a:effectLst/>
+                <a:latin typeface=".AppleSystemUIFont"/>
+              </a:rPr>
+              <a:t>into</a:t>
+            </a:r>
+            <a:r>
+              <a:rPr lang="pl-PL" dirty="0">
+                <a:solidFill>
+                  <a:srgbClr val="0E0E0E"/>
+                </a:solidFill>
+                <a:effectLst/>
+                <a:latin typeface=".AppleSystemUIFont"/>
+              </a:rPr>
+              <a:t> a </a:t>
+            </a:r>
+            <a:r>
+              <a:rPr lang="pl-PL" dirty="0" err="1">
+                <a:solidFill>
+                  <a:srgbClr val="0E0E0E"/>
+                </a:solidFill>
+                <a:effectLst/>
+                <a:latin typeface=".AppleSystemUIFont"/>
+              </a:rPr>
+              <a:t>classification</a:t>
+            </a:r>
+            <a:r>
+              <a:rPr lang="pl-PL" dirty="0">
+                <a:solidFill>
+                  <a:srgbClr val="0E0E0E"/>
+                </a:solidFill>
+                <a:effectLst/>
+                <a:latin typeface=".AppleSystemUIFont"/>
+              </a:rPr>
+              <a:t> </a:t>
+            </a:r>
+            <a:r>
+              <a:rPr lang="pl-PL" dirty="0" err="1">
+                <a:solidFill>
+                  <a:srgbClr val="0E0E0E"/>
+                </a:solidFill>
+                <a:effectLst/>
+                <a:latin typeface=".AppleSystemUIFont"/>
+              </a:rPr>
+              <a:t>task</a:t>
+            </a:r>
+            <a:r>
+              <a:rPr lang="pl-PL" dirty="0">
+                <a:solidFill>
+                  <a:srgbClr val="0E0E0E"/>
+                </a:solidFill>
+                <a:effectLst/>
+                <a:latin typeface=".AppleSystemUIFont"/>
+              </a:rPr>
+              <a:t>, </a:t>
+            </a:r>
+            <a:r>
+              <a:rPr lang="pl-PL" dirty="0" err="1">
+                <a:solidFill>
+                  <a:srgbClr val="0E0E0E"/>
+                </a:solidFill>
+                <a:effectLst/>
+                <a:latin typeface=".AppleSystemUIFont"/>
+              </a:rPr>
+              <a:t>they</a:t>
+            </a:r>
+            <a:r>
+              <a:rPr lang="pl-PL" dirty="0">
+                <a:solidFill>
+                  <a:srgbClr val="0E0E0E"/>
+                </a:solidFill>
+                <a:effectLst/>
+                <a:latin typeface=".AppleSystemUIFont"/>
+              </a:rPr>
+              <a:t> </a:t>
+            </a:r>
+            <a:r>
+              <a:rPr lang="pl-PL" dirty="0" err="1">
+                <a:solidFill>
+                  <a:srgbClr val="0E0E0E"/>
+                </a:solidFill>
+                <a:effectLst/>
+                <a:latin typeface=".AppleSystemUIFont"/>
+              </a:rPr>
+              <a:t>still</a:t>
+            </a:r>
+            <a:r>
+              <a:rPr lang="pl-PL" dirty="0">
+                <a:solidFill>
+                  <a:srgbClr val="0E0E0E"/>
+                </a:solidFill>
+                <a:effectLst/>
+                <a:latin typeface=".AppleSystemUIFont"/>
+              </a:rPr>
+              <a:t> </a:t>
+            </a:r>
+            <a:r>
+              <a:rPr lang="pl-PL" dirty="0" err="1">
+                <a:solidFill>
+                  <a:srgbClr val="0E0E0E"/>
+                </a:solidFill>
+                <a:effectLst/>
+                <a:latin typeface=".AppleSystemUIFont"/>
+              </a:rPr>
+              <a:t>perform</a:t>
+            </a:r>
+            <a:r>
+              <a:rPr lang="pl-PL" dirty="0">
+                <a:solidFill>
+                  <a:srgbClr val="0E0E0E"/>
+                </a:solidFill>
+                <a:effectLst/>
+                <a:latin typeface=".AppleSystemUIFont"/>
+              </a:rPr>
+              <a:t> </a:t>
+            </a:r>
+            <a:r>
+              <a:rPr lang="pl-PL" dirty="0" err="1">
+                <a:solidFill>
+                  <a:srgbClr val="0E0E0E"/>
+                </a:solidFill>
+                <a:effectLst/>
+                <a:latin typeface=".AppleSystemUIFont"/>
+              </a:rPr>
+              <a:t>better</a:t>
+            </a:r>
+            <a:endParaRPr lang="pl-PL" dirty="0">
+              <a:solidFill>
+                <a:srgbClr val="0E0E0E"/>
+              </a:solidFill>
+              <a:effectLst/>
+              <a:latin typeface=".AppleSystemUIFont"/>
+            </a:endParaRPr>
           </a:p>
         </p:txBody>
       </p:sp>
     </p:spTree>
     <p:extLst>
       <p:ext uri="{BB962C8B-B14F-4D97-AF65-F5344CB8AC3E}">
-        <p14:creationId xmlns:p14="http://schemas.microsoft.com/office/powerpoint/2010/main" val="4152106052"/>
+        <p14:creationId xmlns:p14="http://schemas.microsoft.com/office/powerpoint/2010/main" val="1926648235"/>
       </p:ext>
     </p:extLst>
   </p:cSld>
@@ -24851,12 +26088,18 @@
 </p:sld>
 </file>
 
-<file path=ppt/slides/slide12.xml><?xml version="1.0" encoding="utf-8"?>
+<file path=ppt/slides/slide18.xml><?xml version="1.0" encoding="utf-8"?>
 <p:sld xmlns:a="http://schemas.openxmlformats.org/drawingml/2006/main" xmlns:r="http://schemas.openxmlformats.org/officeDocument/2006/relationships" xmlns:p="http://schemas.openxmlformats.org/presentationml/2006/main">
   <p:cSld>
     <p:spTree>
       <p:nvGrpSpPr>
-        <p:cNvPr id="1" name=""/>
+        <p:cNvPr id="1" name="">
+          <a:extLst>
+            <a:ext uri="{FF2B5EF4-FFF2-40B4-BE49-F238E27FC236}">
+              <a16:creationId xmlns:a16="http://schemas.microsoft.com/office/drawing/2014/main" id="{4C02F7EB-3081-D85C-17F8-FB205A607096}"/>
+            </a:ext>
+          </a:extLst>
+        </p:cNvPr>
         <p:cNvGrpSpPr/>
         <p:nvPr/>
       </p:nvGrpSpPr>
@@ -24873,7 +26116,7 @@
           <p:cNvPr id="2" name="Tytuł 1">
             <a:extLst>
               <a:ext uri="{FF2B5EF4-FFF2-40B4-BE49-F238E27FC236}">
-                <a16:creationId xmlns:a16="http://schemas.microsoft.com/office/drawing/2014/main" id="{48EE26EC-DE95-760D-1D1A-06C07F65D8DD}"/>
+                <a16:creationId xmlns:a16="http://schemas.microsoft.com/office/drawing/2014/main" id="{DC4420EA-F69A-A8BB-4A44-A2EB991C1D2D}"/>
               </a:ext>
             </a:extLst>
           </p:cNvPr>
@@ -24881,67 +26124,155 @@
             <a:spLocks noGrp="1"/>
           </p:cNvSpPr>
           <p:nvPr>
-            <p:ph type="title"/>
+            <p:ph type="ctrTitle"/>
           </p:nvPr>
         </p:nvSpPr>
-        <p:spPr/>
+        <p:spPr>
+          <a:xfrm>
+            <a:off x="0" y="3029669"/>
+            <a:ext cx="12191999" cy="798661"/>
+          </a:xfrm>
+        </p:spPr>
         <p:txBody>
-          <a:bodyPr/>
+          <a:bodyPr>
+            <a:normAutofit/>
+          </a:bodyPr>
           <a:lstStyle/>
           <a:p>
             <a:r>
-              <a:rPr lang="pl-PL" dirty="0" err="1"/>
+              <a:rPr lang="pl-PL" sz="4800" dirty="0" err="1">
+                <a:solidFill>
+                  <a:srgbClr val="0E0E0E"/>
+                </a:solidFill>
+                <a:effectLst/>
+                <a:latin typeface=".AppleSystemUIFont"/>
+              </a:rPr>
               <a:t>Regression</a:t>
             </a:r>
             <a:r>
-              <a:rPr lang="pl-PL" dirty="0"/>
-              <a:t> vs </a:t>
-            </a:r>
-            <a:r>
-              <a:rPr lang="pl-PL" dirty="0" err="1"/>
-              <a:t>Classification</a:t>
-            </a:r>
-            <a:r>
-              <a:rPr lang="pl-PL" dirty="0"/>
+              <a:rPr lang="pl-PL" sz="4800" dirty="0">
+                <a:solidFill>
+                  <a:srgbClr val="0E0E0E"/>
+                </a:solidFill>
+                <a:effectLst/>
+                <a:latin typeface=".AppleSystemUIFont"/>
+              </a:rPr>
               <a:t> </a:t>
             </a:r>
             <a:r>
-              <a:rPr lang="pl-PL" dirty="0" err="1"/>
-              <a:t>Comprasion</a:t>
+              <a:rPr lang="pl-PL" sz="4800" dirty="0" err="1">
+                <a:solidFill>
+                  <a:srgbClr val="0E0E0E"/>
+                </a:solidFill>
+                <a:effectLst/>
+                <a:latin typeface=".AppleSystemUIFont"/>
+              </a:rPr>
+              <a:t>is</a:t>
             </a:r>
-            <a:endParaRPr lang="pl-PL" dirty="0"/>
-          </a:p>
-        </p:txBody>
-      </p:sp>
-      <p:sp>
-        <p:nvSpPr>
-          <p:cNvPr id="3" name="Symbol zastępczy zawartości 2">
-            <a:extLst>
-              <a:ext uri="{FF2B5EF4-FFF2-40B4-BE49-F238E27FC236}">
-                <a16:creationId xmlns:a16="http://schemas.microsoft.com/office/drawing/2014/main" id="{1FA671E9-9FD3-2C2C-D693-DE9870B9F91F}"/>
-              </a:ext>
-            </a:extLst>
-          </p:cNvPr>
-          <p:cNvSpPr>
-            <a:spLocks noGrp="1"/>
-          </p:cNvSpPr>
-          <p:nvPr>
-            <p:ph idx="1"/>
-          </p:nvPr>
-        </p:nvSpPr>
-        <p:spPr/>
-        <p:txBody>
-          <a:bodyPr/>
-          <a:lstStyle/>
-          <a:p>
-            <a:endParaRPr lang="pl-PL"/>
+            <a:r>
+              <a:rPr lang="pl-PL" sz="4800" dirty="0">
+                <a:solidFill>
+                  <a:srgbClr val="0E0E0E"/>
+                </a:solidFill>
+                <a:effectLst/>
+                <a:latin typeface=".AppleSystemUIFont"/>
+              </a:rPr>
+              <a:t> </a:t>
+            </a:r>
+            <a:r>
+              <a:rPr lang="pl-PL" sz="4800" b="1" dirty="0">
+                <a:solidFill>
+                  <a:srgbClr val="0070C0"/>
+                </a:solidFill>
+                <a:effectLst/>
+                <a:latin typeface=".AppleSystemUIFont"/>
+              </a:rPr>
+              <a:t>DEFINITELY</a:t>
+            </a:r>
+            <a:r>
+              <a:rPr lang="pl-PL" sz="4800" dirty="0">
+                <a:solidFill>
+                  <a:srgbClr val="0E0E0E"/>
+                </a:solidFill>
+                <a:effectLst/>
+                <a:latin typeface=".AppleSystemUIFont"/>
+              </a:rPr>
+              <a:t> </a:t>
+            </a:r>
+            <a:r>
+              <a:rPr lang="pl-PL" sz="4800" dirty="0" err="1">
+                <a:solidFill>
+                  <a:srgbClr val="0E0E0E"/>
+                </a:solidFill>
+                <a:effectLst/>
+                <a:latin typeface=".AppleSystemUIFont"/>
+              </a:rPr>
+              <a:t>better</a:t>
+            </a:r>
+            <a:r>
+              <a:rPr lang="pl-PL" sz="4800" dirty="0">
+                <a:solidFill>
+                  <a:srgbClr val="0E0E0E"/>
+                </a:solidFill>
+                <a:effectLst/>
+                <a:latin typeface=".AppleSystemUIFont"/>
+              </a:rPr>
+              <a:t> for </a:t>
+            </a:r>
+            <a:r>
+              <a:rPr lang="pl-PL" sz="4800" dirty="0" err="1">
+                <a:solidFill>
+                  <a:srgbClr val="0E0E0E"/>
+                </a:solidFill>
+                <a:effectLst/>
+                <a:latin typeface=".AppleSystemUIFont"/>
+              </a:rPr>
+              <a:t>this</a:t>
+            </a:r>
+            <a:r>
+              <a:rPr lang="pl-PL" sz="4800" dirty="0">
+                <a:solidFill>
+                  <a:srgbClr val="0E0E0E"/>
+                </a:solidFill>
+                <a:effectLst/>
+                <a:latin typeface=".AppleSystemUIFont"/>
+              </a:rPr>
+              <a:t> </a:t>
+            </a:r>
+            <a:r>
+              <a:rPr lang="pl-PL" sz="4800" dirty="0" err="1">
+                <a:solidFill>
+                  <a:srgbClr val="0E0E0E"/>
+                </a:solidFill>
+                <a:effectLst/>
+                <a:latin typeface=".AppleSystemUIFont"/>
+              </a:rPr>
+              <a:t>task</a:t>
+            </a:r>
+            <a:r>
+              <a:rPr lang="pl-PL" sz="4800" dirty="0">
+                <a:solidFill>
+                  <a:srgbClr val="0E0E0E"/>
+                </a:solidFill>
+                <a:effectLst/>
+                <a:latin typeface=".AppleSystemUIFont"/>
+              </a:rPr>
+              <a:t>.</a:t>
+            </a:r>
+            <a:endParaRPr lang="pl-PL" sz="8000" dirty="0">
+              <a:solidFill>
+                <a:srgbClr val="0E0E0E"/>
+              </a:solidFill>
+              <a:effectLst/>
+              <a:latin typeface=".AppleSystemUIFont"/>
+            </a:endParaRPr>
           </a:p>
         </p:txBody>
       </p:sp>
     </p:spTree>
     <p:extLst>
       <p:ext uri="{BB962C8B-B14F-4D97-AF65-F5344CB8AC3E}">
-        <p14:creationId xmlns:p14="http://schemas.microsoft.com/office/powerpoint/2010/main" val="1217871469"/>
+        <p14:creationId xmlns:p14="http://schemas.microsoft.com/office/powerpoint/2010/main" val="2766720544"/>
       </p:ext>
     </p:extLst>
   </p:cSld>
@@ -24951,7 +26282,7 @@
 </p:sld>
 </file>
 
-<file path=ppt/slides/slide13.xml><?xml version="1.0" encoding="utf-8"?>
+<file path=ppt/slides/slide19.xml><?xml version="1.0" encoding="utf-8"?>
 <p:sld xmlns:a="http://schemas.openxmlformats.org/drawingml/2006/main" xmlns:r="http://schemas.openxmlformats.org/officeDocument/2006/relationships" xmlns:p="http://schemas.openxmlformats.org/presentationml/2006/main">
   <p:cSld>
     <p:spTree>
@@ -25331,7 +26662,7 @@
             <p:ph idx="1"/>
             <p:extLst>
               <p:ext uri="{D42A27DB-BD31-4B8C-83A1-F6EECF244321}">
-                <p14:modId xmlns:p14="http://schemas.microsoft.com/office/powerpoint/2010/main" val="4013020535"/>
+                <p14:modId xmlns:p14="http://schemas.microsoft.com/office/powerpoint/2010/main" val="1080187143"/>
               </p:ext>
             </p:extLst>
           </p:nvPr>
@@ -25740,110 +27071,10 @@
       </p:grpSpPr>
       <p:sp>
         <p:nvSpPr>
-          <p:cNvPr id="2" name="Tytuł 1">
+          <p:cNvPr id="4" name="Tytuł 3">
             <a:extLst>
               <a:ext uri="{FF2B5EF4-FFF2-40B4-BE49-F238E27FC236}">
-                <a16:creationId xmlns:a16="http://schemas.microsoft.com/office/drawing/2014/main" id="{C4031975-4909-AC99-C4EA-4A6E7BF2E263}"/>
-              </a:ext>
-            </a:extLst>
-          </p:cNvPr>
-          <p:cNvSpPr>
-            <a:spLocks noGrp="1"/>
-          </p:cNvSpPr>
-          <p:nvPr>
-            <p:ph type="title"/>
-          </p:nvPr>
-        </p:nvSpPr>
-        <p:spPr/>
-        <p:txBody>
-          <a:bodyPr/>
-          <a:lstStyle/>
-          <a:p>
-            <a:r>
-              <a:rPr lang="pl-PL" dirty="0" err="1"/>
-              <a:t>Number</a:t>
-            </a:r>
-            <a:r>
-              <a:rPr lang="pl-PL" dirty="0"/>
-              <a:t> of </a:t>
-            </a:r>
-            <a:r>
-              <a:rPr lang="pl-PL" dirty="0" err="1"/>
-              <a:t>classification</a:t>
-            </a:r>
-            <a:r>
-              <a:rPr lang="pl-PL" dirty="0"/>
-              <a:t> </a:t>
-            </a:r>
-            <a:r>
-              <a:rPr lang="pl-PL" dirty="0" err="1"/>
-              <a:t>intervals</a:t>
-            </a:r>
-            <a:endParaRPr lang="pl-PL" dirty="0"/>
-          </a:p>
-        </p:txBody>
-      </p:sp>
-      <p:sp>
-        <p:nvSpPr>
-          <p:cNvPr id="3" name="Symbol zastępczy zawartości 2">
-            <a:extLst>
-              <a:ext uri="{FF2B5EF4-FFF2-40B4-BE49-F238E27FC236}">
-                <a16:creationId xmlns:a16="http://schemas.microsoft.com/office/drawing/2014/main" id="{6BD8032A-8884-3BDC-B9FA-BF4E389A7D41}"/>
-              </a:ext>
-            </a:extLst>
-          </p:cNvPr>
-          <p:cNvSpPr>
-            <a:spLocks noGrp="1"/>
-          </p:cNvSpPr>
-          <p:nvPr>
-            <p:ph idx="1"/>
-          </p:nvPr>
-        </p:nvSpPr>
-        <p:spPr/>
-        <p:txBody>
-          <a:bodyPr/>
-          <a:lstStyle/>
-          <a:p>
-            <a:endParaRPr lang="pl-PL" dirty="0"/>
-          </a:p>
-        </p:txBody>
-      </p:sp>
-    </p:spTree>
-    <p:extLst>
-      <p:ext uri="{BB962C8B-B14F-4D97-AF65-F5344CB8AC3E}">
-        <p14:creationId xmlns:p14="http://schemas.microsoft.com/office/powerpoint/2010/main" val="1926648235"/>
-      </p:ext>
-    </p:extLst>
-  </p:cSld>
-  <p:clrMapOvr>
-    <a:masterClrMapping/>
-  </p:clrMapOvr>
-</p:sld>
-</file>
-
-<file path=ppt/slides/slide9.xml><?xml version="1.0" encoding="utf-8"?>
-<p:sld xmlns:a="http://schemas.openxmlformats.org/drawingml/2006/main" xmlns:r="http://schemas.openxmlformats.org/officeDocument/2006/relationships" xmlns:p="http://schemas.openxmlformats.org/presentationml/2006/main">
-  <p:cSld>
-    <p:spTree>
-      <p:nvGrpSpPr>
-        <p:cNvPr id="1" name=""/>
-        <p:cNvGrpSpPr/>
-        <p:nvPr/>
-      </p:nvGrpSpPr>
-      <p:grpSpPr>
-        <a:xfrm>
-          <a:off x="0" y="0"/>
-          <a:ext cx="0" cy="0"/>
-          <a:chOff x="0" y="0"/>
-          <a:chExt cx="0" cy="0"/>
-        </a:xfrm>
-      </p:grpSpPr>
-      <p:sp>
-        <p:nvSpPr>
-          <p:cNvPr id="2" name="Tytuł 1">
-            <a:extLst>
-              <a:ext uri="{FF2B5EF4-FFF2-40B4-BE49-F238E27FC236}">
-                <a16:creationId xmlns:a16="http://schemas.microsoft.com/office/drawing/2014/main" id="{B0A1702C-39F9-E13D-78C5-55C68D5D3ED8}"/>
+                <a16:creationId xmlns:a16="http://schemas.microsoft.com/office/drawing/2014/main" id="{DCBB528D-438E-9117-CF54-ED27E1A68778}"/>
               </a:ext>
             </a:extLst>
           </p:cNvPr>
@@ -25865,18 +27096,83 @@
             </a:r>
             <a:r>
               <a:rPr lang="pl-PL" dirty="0" err="1"/>
-              <a:t>Models</a:t>
+              <a:t>Classification</a:t>
             </a:r>
             <a:endParaRPr lang="pl-PL" dirty="0"/>
           </a:p>
         </p:txBody>
       </p:sp>
+      <p:pic>
+        <p:nvPicPr>
+          <p:cNvPr id="7" name="Symbol zastępczy zawartości 6" descr="Obraz zawierający linia, Wykres, diagram, zrzut ekranu&#10;&#10;Opis wygenerowany automatycznie">
+            <a:extLst>
+              <a:ext uri="{FF2B5EF4-FFF2-40B4-BE49-F238E27FC236}">
+                <a16:creationId xmlns:a16="http://schemas.microsoft.com/office/drawing/2014/main" id="{51BCDF5F-28B6-097E-F49C-D926084FB0EA}"/>
+              </a:ext>
+            </a:extLst>
+          </p:cNvPr>
+          <p:cNvPicPr>
+            <a:picLocks noGrp="1" noChangeAspect="1"/>
+          </p:cNvPicPr>
+          <p:nvPr>
+            <p:ph idx="1"/>
+          </p:nvPr>
+        </p:nvPicPr>
+        <p:blipFill>
+          <a:blip r:embed="rId2"/>
+          <a:stretch>
+            <a:fillRect/>
+          </a:stretch>
+        </p:blipFill>
+        <p:spPr>
+          <a:xfrm>
+            <a:off x="766427" y="1690688"/>
+            <a:ext cx="10515600" cy="4685168"/>
+          </a:xfrm>
+        </p:spPr>
+      </p:pic>
+    </p:spTree>
+    <p:extLst>
+      <p:ext uri="{BB962C8B-B14F-4D97-AF65-F5344CB8AC3E}">
+        <p14:creationId xmlns:p14="http://schemas.microsoft.com/office/powerpoint/2010/main" val="1169454028"/>
+      </p:ext>
+    </p:extLst>
+  </p:cSld>
+  <p:clrMapOvr>
+    <a:masterClrMapping/>
+  </p:clrMapOvr>
+</p:sld>
+</file>
+
+<file path=ppt/slides/slide9.xml><?xml version="1.0" encoding="utf-8"?>
+<p:sld xmlns:a="http://schemas.openxmlformats.org/drawingml/2006/main" xmlns:r="http://schemas.openxmlformats.org/officeDocument/2006/relationships" xmlns:p="http://schemas.openxmlformats.org/presentationml/2006/main">
+  <p:cSld>
+    <p:spTree>
+      <p:nvGrpSpPr>
+        <p:cNvPr id="1" name="">
+          <a:extLst>
+            <a:ext uri="{FF2B5EF4-FFF2-40B4-BE49-F238E27FC236}">
+              <a16:creationId xmlns:a16="http://schemas.microsoft.com/office/drawing/2014/main" id="{C57ABC10-7D08-1F31-68BF-C9AFBF41CE44}"/>
+            </a:ext>
+          </a:extLst>
+        </p:cNvPr>
+        <p:cNvGrpSpPr/>
+        <p:nvPr/>
+      </p:nvGrpSpPr>
+      <p:grpSpPr>
+        <a:xfrm>
+          <a:off x="0" y="0"/>
+          <a:ext cx="0" cy="0"/>
+          <a:chOff x="0" y="0"/>
+          <a:chExt cx="0" cy="0"/>
+        </a:xfrm>
+      </p:grpSpPr>
       <p:sp>
         <p:nvSpPr>
-          <p:cNvPr id="3" name="Symbol zastępczy zawartości 2">
+          <p:cNvPr id="4" name="Tytuł 3">
             <a:extLst>
               <a:ext uri="{FF2B5EF4-FFF2-40B4-BE49-F238E27FC236}">
-                <a16:creationId xmlns:a16="http://schemas.microsoft.com/office/drawing/2014/main" id="{4D7C8CF9-2B7F-6A73-D497-D7DF4EAD9E75}"/>
+                <a16:creationId xmlns:a16="http://schemas.microsoft.com/office/drawing/2014/main" id="{19E2EE29-2254-7C4A-7EEC-7DDB8C47947A}"/>
               </a:ext>
             </a:extLst>
           </p:cNvPr>
@@ -25884,7 +27180,7 @@
             <a:spLocks noGrp="1"/>
           </p:cNvSpPr>
           <p:nvPr>
-            <p:ph idx="1"/>
+            <p:ph type="title"/>
           </p:nvPr>
         </p:nvSpPr>
         <p:spPr/>
@@ -25892,14 +27188,50 @@
           <a:bodyPr/>
           <a:lstStyle/>
           <a:p>
-            <a:endParaRPr lang="pl-PL"/>
+            <a:r>
+              <a:rPr lang="pl-PL" dirty="0"/>
+              <a:t>Advanced </a:t>
+            </a:r>
+            <a:r>
+              <a:rPr lang="pl-PL" dirty="0" err="1"/>
+              <a:t>Classification</a:t>
+            </a:r>
+            <a:endParaRPr lang="pl-PL" dirty="0"/>
           </a:p>
         </p:txBody>
       </p:sp>
+      <p:pic>
+        <p:nvPicPr>
+          <p:cNvPr id="7" name="Symbol zastępczy zawartości 6">
+            <a:extLst>
+              <a:ext uri="{FF2B5EF4-FFF2-40B4-BE49-F238E27FC236}">
+                <a16:creationId xmlns:a16="http://schemas.microsoft.com/office/drawing/2014/main" id="{07E8E72E-DACA-4152-5D7B-5FA9C7416D4F}"/>
+              </a:ext>
+            </a:extLst>
+          </p:cNvPr>
+          <p:cNvPicPr>
+            <a:picLocks noGrp="1" noChangeAspect="1"/>
+          </p:cNvPicPr>
+          <p:nvPr>
+            <p:ph idx="1"/>
+          </p:nvPr>
+        </p:nvPicPr>
+        <p:blipFill>
+          <a:blip r:embed="rId2"/>
+          <a:srcRect/>
+          <a:stretch/>
+        </p:blipFill>
+        <p:spPr>
+          <a:xfrm>
+            <a:off x="766427" y="1690688"/>
+            <a:ext cx="10515600" cy="4685168"/>
+          </a:xfrm>
+        </p:spPr>
+      </p:pic>
     </p:spTree>
     <p:extLst>
       <p:ext uri="{BB962C8B-B14F-4D97-AF65-F5344CB8AC3E}">
-        <p14:creationId xmlns:p14="http://schemas.microsoft.com/office/powerpoint/2010/main" val="321059128"/>
+        <p14:creationId xmlns:p14="http://schemas.microsoft.com/office/powerpoint/2010/main" val="2335828164"/>
       </p:ext>
     </p:extLst>
   </p:cSld>

</xml_diff>